<commit_message>
Image: Added image into notebook
</commit_message>
<xml_diff>
--- a/pyxem/PyxemPresentation-2025.pptx
+++ b/pyxem/PyxemPresentation-2025.pptx
@@ -336,7 +336,7 @@
           <a:p>
             <a:fld id="{5FE5FEC7-5059-4D45-83D4-AE610EDF602F}" type="datetimeFigureOut">
               <a:rPr lang="en-US" smtClean="0"/>
-              <a:t>5/27/25</a:t>
+              <a:t>6/4/25</a:t>
             </a:fld>
             <a:endParaRPr lang="en-US"/>
           </a:p>
@@ -2592,7 +2592,7 @@
           <a:p>
             <a:fld id="{360AAC34-07E6-5747-81D7-0FAC844A8F0E}" type="datetimeFigureOut">
               <a:rPr lang="en-US" smtClean="0"/>
-              <a:t>5/29/25</a:t>
+              <a:t>6/4/25</a:t>
             </a:fld>
             <a:endParaRPr lang="en-US"/>
           </a:p>
@@ -2856,7 +2856,7 @@
           <a:p>
             <a:fld id="{360AAC34-07E6-5747-81D7-0FAC844A8F0E}" type="datetimeFigureOut">
               <a:rPr lang="en-US" smtClean="0"/>
-              <a:t>5/27/25</a:t>
+              <a:t>6/4/25</a:t>
             </a:fld>
             <a:endParaRPr lang="en-US"/>
           </a:p>
@@ -5367,14 +5367,14 @@
             <p:ph idx="1"/>
             <p:extLst>
               <p:ext uri="{D42A27DB-BD31-4B8C-83A1-F6EECF244321}">
-                <p14:modId xmlns:p14="http://schemas.microsoft.com/office/powerpoint/2010/main" val="3401196192"/>
+                <p14:modId xmlns:p14="http://schemas.microsoft.com/office/powerpoint/2010/main" val="1926556059"/>
               </p:ext>
             </p:extLst>
           </p:nvPr>
         </p:nvGraphicFramePr>
         <p:xfrm>
-          <a:off x="445732" y="200489"/>
-          <a:ext cx="11637780" cy="6457022"/>
+          <a:off x="457924" y="63328"/>
+          <a:ext cx="11637780" cy="6734762"/>
         </p:xfrm>
         <a:graphic>
           <a:graphicData uri="http://schemas.openxmlformats.org/drawingml/2006/table">
@@ -6321,7 +6321,7 @@
                 </a:extLst>
               </a:tr>
               <a:tr h="241041">
-                <a:tc rowSpan="11">
+                <a:tc rowSpan="13">
                   <a:txBody>
                     <a:bodyPr/>
                     <a:lstStyle/>
@@ -6730,7 +6730,7 @@
                   </a:ext>
                 </a:extLst>
               </a:tr>
-              <a:tr h="409770">
+              <a:tr h="200118">
                 <a:tc vMerge="1">
                   <a:txBody>
                     <a:bodyPr/>
@@ -6810,7 +6810,7 @@
                   </a:ext>
                 </a:extLst>
               </a:tr>
-              <a:tr h="409770">
+              <a:tr h="169638">
                 <a:tc vMerge="1">
                   <a:txBody>
                     <a:bodyPr/>
@@ -7136,7 +7136,7 @@
                   </a:ext>
                 </a:extLst>
               </a:tr>
-              <a:tr h="241041">
+              <a:tr h="179402">
                 <a:tc vMerge="1">
                   <a:txBody>
                     <a:bodyPr/>
@@ -7220,6 +7220,171 @@
                 <a:extLst>
                   <a:ext uri="{0D108BD9-81ED-4DB2-BD59-A6C34878D82A}">
                     <a16:rowId xmlns:a16="http://schemas.microsoft.com/office/drawing/2014/main" val="128240986"/>
+                  </a:ext>
+                </a:extLst>
+              </a:tr>
+              <a:tr h="241041">
+                <a:tc vMerge="1">
+                  <a:txBody>
+                    <a:bodyPr/>
+                    <a:lstStyle/>
+                    <a:p>
+                      <a:pPr algn="ctr"/>
+                      <a:endParaRPr lang="en-US" sz="1200" dirty="0"/>
+                    </a:p>
+                  </a:txBody>
+                  <a:tcPr anchor="ctr">
+                    <a:solidFill>
+                      <a:schemeClr val="accent1">
+                        <a:lumMod val="75000"/>
+                      </a:schemeClr>
+                    </a:solidFill>
+                  </a:tcPr>
+                </a:tc>
+                <a:tc>
+                  <a:txBody>
+                    <a:bodyPr/>
+                    <a:lstStyle/>
+                    <a:p>
+                      <a:pPr algn="ctr"/>
+                      <a:r>
+                        <a:rPr lang="en-US" sz="1200" dirty="0">
+                          <a:solidFill>
+                            <a:schemeClr val="bg1"/>
+                          </a:solidFill>
+                        </a:rPr>
+                        <a:t>Dynamical Characterization</a:t>
+                      </a:r>
+                    </a:p>
+                  </a:txBody>
+                  <a:tcPr>
+                    <a:solidFill>
+                      <a:schemeClr val="accent1">
+                        <a:lumMod val="75000"/>
+                      </a:schemeClr>
+                    </a:solidFill>
+                  </a:tcPr>
+                </a:tc>
+                <a:tc>
+                  <a:txBody>
+                    <a:bodyPr/>
+                    <a:lstStyle/>
+                    <a:p>
+                      <a:pPr algn="ctr"/>
+                      <a:endParaRPr lang="en-US" sz="1200" b="1" dirty="0"/>
+                    </a:p>
+                  </a:txBody>
+                  <a:tcPr/>
+                </a:tc>
+                <a:tc>
+                  <a:txBody>
+                    <a:bodyPr/>
+                    <a:lstStyle/>
+                    <a:p>
+                      <a:pPr algn="ctr"/>
+                      <a:r>
+                        <a:rPr lang="en-US" sz="1200" b="1" dirty="0"/>
+                        <a:t>xxx</a:t>
+                      </a:r>
+                    </a:p>
+                  </a:txBody>
+                  <a:tcPr/>
+                </a:tc>
+                <a:tc>
+                  <a:txBody>
+                    <a:bodyPr/>
+                    <a:lstStyle/>
+                    <a:p>
+                      <a:pPr algn="ctr"/>
+                      <a:endParaRPr lang="en-US" sz="1200" dirty="0"/>
+                    </a:p>
+                  </a:txBody>
+                  <a:tcPr/>
+                </a:tc>
+                <a:extLst>
+                  <a:ext uri="{0D108BD9-81ED-4DB2-BD59-A6C34878D82A}">
+                    <a16:rowId xmlns:a16="http://schemas.microsoft.com/office/drawing/2014/main" val="2801782016"/>
+                  </a:ext>
+                </a:extLst>
+              </a:tr>
+              <a:tr h="241041">
+                <a:tc vMerge="1">
+                  <a:txBody>
+                    <a:bodyPr/>
+                    <a:lstStyle/>
+                    <a:p>
+                      <a:pPr algn="ctr"/>
+                      <a:endParaRPr lang="en-US" sz="1200" dirty="0"/>
+                    </a:p>
+                  </a:txBody>
+                  <a:tcPr anchor="ctr">
+                    <a:solidFill>
+                      <a:schemeClr val="accent1">
+                        <a:lumMod val="75000"/>
+                      </a:schemeClr>
+                    </a:solidFill>
+                  </a:tcPr>
+                </a:tc>
+                <a:tc>
+                  <a:txBody>
+                    <a:bodyPr/>
+                    <a:lstStyle/>
+                    <a:p>
+                      <a:pPr algn="ctr"/>
+                      <a:r>
+                        <a:rPr lang="en-US" sz="1200" dirty="0">
+                          <a:solidFill>
+                            <a:schemeClr val="bg1"/>
+                          </a:solidFill>
+                        </a:rPr>
+                        <a:t>Vector Orientation Mapping</a:t>
+                      </a:r>
+                    </a:p>
+                  </a:txBody>
+                  <a:tcPr>
+                    <a:solidFill>
+                      <a:schemeClr val="accent1">
+                        <a:lumMod val="75000"/>
+                      </a:schemeClr>
+                    </a:solidFill>
+                  </a:tcPr>
+                </a:tc>
+                <a:tc>
+                  <a:txBody>
+                    <a:bodyPr/>
+                    <a:lstStyle/>
+                    <a:p>
+                      <a:pPr algn="ctr"/>
+                      <a:endParaRPr lang="en-US" sz="1200" b="1" dirty="0"/>
+                    </a:p>
+                  </a:txBody>
+                  <a:tcPr/>
+                </a:tc>
+                <a:tc>
+                  <a:txBody>
+                    <a:bodyPr/>
+                    <a:lstStyle/>
+                    <a:p>
+                      <a:pPr algn="ctr"/>
+                      <a:endParaRPr lang="en-US" sz="1200" b="1" dirty="0"/>
+                    </a:p>
+                  </a:txBody>
+                  <a:tcPr/>
+                </a:tc>
+                <a:tc>
+                  <a:txBody>
+                    <a:bodyPr/>
+                    <a:lstStyle/>
+                    <a:p>
+                      <a:pPr algn="ctr"/>
+                      <a:endParaRPr lang="en-US" sz="1200" dirty="0"/>
+                    </a:p>
+                  </a:txBody>
+                  <a:tcPr/>
+                </a:tc>
+                <a:extLst>
+                  <a:ext uri="{0D108BD9-81ED-4DB2-BD59-A6C34878D82A}">
+                    <a16:rowId xmlns:a16="http://schemas.microsoft.com/office/drawing/2014/main" val="6687564"/>
                   </a:ext>
                 </a:extLst>
               </a:tr>
@@ -7648,6 +7813,12 @@
             <a:r>
               <a:rPr lang="en-US" sz="2400" dirty="0"/>
               <a:t>Cutting-edge development but slightly less stable</a:t>
+            </a:r>
+          </a:p>
+          <a:p>
+            <a:r>
+              <a:rPr lang="en-US" sz="2400" dirty="0"/>
+              <a:t>Dynamical diffraction and nice experiment driven design</a:t>
             </a:r>
           </a:p>
           <a:p>

</xml_diff>